<commit_message>
Slides 02_conditions_parameterization: Tipps und Warnungen Folie fuer if - else, nachtrag: Ein beispiel mit klammern
</commit_message>
<xml_diff>
--- a/slides/02_conditions_parameterization.pptx
+++ b/slides/02_conditions_parameterization.pptx
@@ -11378,6 +11378,72 @@
           </a:prstGeom>
         </p:spPr>
       </p:pic>
+      <p:pic>
+        <p:nvPicPr>
+          <p:cNvPr id="4" name="Grafik 3">
+            <a:extLst>
+              <a:ext uri="{FF2B5EF4-FFF2-40B4-BE49-F238E27FC236}">
+                <a16:creationId xmlns:a16="http://schemas.microsoft.com/office/drawing/2014/main" id="{1423BD68-6EA2-0EFF-EFC3-AB207BB3B6E9}"/>
+              </a:ext>
+            </a:extLst>
+          </p:cNvPr>
+          <p:cNvPicPr>
+            <a:picLocks noChangeAspect="1"/>
+          </p:cNvPicPr>
+          <p:nvPr/>
+        </p:nvPicPr>
+        <p:blipFill>
+          <a:blip r:embed="rId4"/>
+          <a:stretch>
+            <a:fillRect/>
+          </a:stretch>
+        </p:blipFill>
+        <p:spPr>
+          <a:xfrm>
+            <a:off x="4285110" y="2192523"/>
+            <a:ext cx="3213456" cy="2142304"/>
+          </a:xfrm>
+          <a:prstGeom prst="rect">
+            <a:avLst/>
+          </a:prstGeom>
+        </p:spPr>
+      </p:pic>
+      <p:cxnSp>
+        <p:nvCxnSpPr>
+          <p:cNvPr id="6" name="Gerader Verbinder 5">
+            <a:extLst>
+              <a:ext uri="{FF2B5EF4-FFF2-40B4-BE49-F238E27FC236}">
+                <a16:creationId xmlns:a16="http://schemas.microsoft.com/office/drawing/2014/main" id="{B80A06F9-D839-70C8-8A2A-9CB5AF755D1A}"/>
+              </a:ext>
+            </a:extLst>
+          </p:cNvPr>
+          <p:cNvCxnSpPr/>
+          <p:nvPr/>
+        </p:nvCxnSpPr>
+        <p:spPr>
+          <a:xfrm>
+            <a:off x="4083509" y="2040203"/>
+            <a:ext cx="4723991" cy="0"/>
+          </a:xfrm>
+          <a:prstGeom prst="line">
+            <a:avLst/>
+          </a:prstGeom>
+        </p:spPr>
+        <p:style>
+          <a:lnRef idx="1">
+            <a:schemeClr val="dk1"/>
+          </a:lnRef>
+          <a:fillRef idx="0">
+            <a:schemeClr val="dk1"/>
+          </a:fillRef>
+          <a:effectRef idx="0">
+            <a:schemeClr val="dk1"/>
+          </a:effectRef>
+          <a:fontRef idx="minor">
+            <a:schemeClr val="tx1"/>
+          </a:fontRef>
+        </p:style>
+      </p:cxnSp>
     </p:spTree>
     <p:extLst>
       <p:ext uri="{BB962C8B-B14F-4D97-AF65-F5344CB8AC3E}">

</xml_diff>

<commit_message>
Slides 02_conditions_parameterization: fehler korrektur in den neuen Folien fuer if - else, und eine weitere folie hinzu mit nem bild
</commit_message>
<xml_diff>
--- a/slides/02_conditions_parameterization.pptx
+++ b/slides/02_conditions_parameterization.pptx
@@ -5,7 +5,7 @@
     <p:sldMasterId id="2147483662" r:id="rId1"/>
   </p:sldMasterIdLst>
   <p:notesMasterIdLst>
-    <p:notesMasterId r:id="rId14"/>
+    <p:notesMasterId r:id="rId15"/>
   </p:notesMasterIdLst>
   <p:sldIdLst>
     <p:sldId id="256" r:id="rId2"/>
@@ -14,12 +14,13 @@
     <p:sldId id="259" r:id="rId5"/>
     <p:sldId id="266" r:id="rId6"/>
     <p:sldId id="267" r:id="rId7"/>
-    <p:sldId id="260" r:id="rId8"/>
-    <p:sldId id="261" r:id="rId9"/>
-    <p:sldId id="262" r:id="rId10"/>
-    <p:sldId id="263" r:id="rId11"/>
-    <p:sldId id="264" r:id="rId12"/>
-    <p:sldId id="265" r:id="rId13"/>
+    <p:sldId id="268" r:id="rId8"/>
+    <p:sldId id="260" r:id="rId9"/>
+    <p:sldId id="261" r:id="rId10"/>
+    <p:sldId id="262" r:id="rId11"/>
+    <p:sldId id="263" r:id="rId12"/>
+    <p:sldId id="264" r:id="rId13"/>
+    <p:sldId id="265" r:id="rId14"/>
   </p:sldIdLst>
   <p:sldSz cx="9144000" cy="5143500" type="screen16x9"/>
   <p:notesSz cx="6858000" cy="9144000"/>
@@ -9784,6 +9785,389 @@
   <p:cSld>
     <p:spTree>
       <p:nvGrpSpPr>
+        <p:cNvPr id="1" name="Shape 126"/>
+        <p:cNvGrpSpPr/>
+        <p:nvPr/>
+      </p:nvGrpSpPr>
+      <p:grpSpPr>
+        <a:xfrm>
+          <a:off x="0" y="0"/>
+          <a:ext cx="0" cy="0"/>
+          <a:chOff x="0" y="0"/>
+          <a:chExt cx="0" cy="0"/>
+        </a:xfrm>
+      </p:grpSpPr>
+      <p:sp>
+        <p:nvSpPr>
+          <p:cNvPr id="127" name="Google Shape;127;p22"/>
+          <p:cNvSpPr txBox="1">
+            <a:spLocks noGrp="1"/>
+          </p:cNvSpPr>
+          <p:nvPr>
+            <p:ph type="title"/>
+          </p:nvPr>
+        </p:nvSpPr>
+        <p:spPr>
+          <a:xfrm>
+            <a:off x="431800" y="83344"/>
+            <a:ext cx="8375700" cy="531000"/>
+          </a:xfrm>
+          <a:prstGeom prst="rect">
+            <a:avLst/>
+          </a:prstGeom>
+          <a:noFill/>
+          <a:ln>
+            <a:noFill/>
+          </a:ln>
+        </p:spPr>
+        <p:txBody>
+          <a:bodyPr spcFirstLastPara="1" wrap="square" lIns="0" tIns="0" rIns="0" bIns="0" anchor="b" anchorCtr="0">
+            <a:noAutofit/>
+          </a:bodyPr>
+          <a:lstStyle/>
+          <a:p>
+            <a:pPr marL="0" lvl="0" indent="0" algn="l" rtl="0">
+              <a:lnSpc>
+                <a:spcPct val="100000"/>
+              </a:lnSpc>
+              <a:spcBef>
+                <a:spcPts val="0"/>
+              </a:spcBef>
+              <a:spcAft>
+                <a:spcPts val="0"/>
+              </a:spcAft>
+              <a:buSzPts val="1400"/>
+              <a:buNone/>
+            </a:pPr>
+            <a:r>
+              <a:rPr lang="de"/>
+              <a:t>2.1. Parametrisierung - Kommandozeilenparameter</a:t>
+            </a:r>
+            <a:endParaRPr/>
+          </a:p>
+        </p:txBody>
+      </p:sp>
+      <p:sp>
+        <p:nvSpPr>
+          <p:cNvPr id="128" name="Google Shape;128;p22"/>
+          <p:cNvSpPr>
+            <a:spLocks noGrp="1"/>
+          </p:cNvSpPr>
+          <p:nvPr>
+            <p:ph type="chart" idx="2"/>
+          </p:nvPr>
+        </p:nvSpPr>
+        <p:spPr>
+          <a:xfrm>
+            <a:off x="431800" y="782241"/>
+            <a:ext cx="8375700" cy="3579000"/>
+          </a:xfrm>
+          <a:prstGeom prst="rect">
+            <a:avLst/>
+          </a:prstGeom>
+          <a:noFill/>
+          <a:ln>
+            <a:noFill/>
+          </a:ln>
+        </p:spPr>
+        <p:txBody>
+          <a:bodyPr spcFirstLastPara="1" wrap="square" lIns="0" tIns="0" rIns="0" bIns="0" anchor="t" anchorCtr="0">
+            <a:noAutofit/>
+          </a:bodyPr>
+          <a:lstStyle/>
+          <a:p>
+            <a:pPr marL="0" marR="0" lvl="0" indent="0" algn="l" rtl="0">
+              <a:lnSpc>
+                <a:spcPct val="100000"/>
+              </a:lnSpc>
+              <a:spcBef>
+                <a:spcPts val="0"/>
+              </a:spcBef>
+              <a:spcAft>
+                <a:spcPts val="0"/>
+              </a:spcAft>
+              <a:buNone/>
+            </a:pPr>
+            <a:r>
+              <a:rPr lang="de" sz="1600" b="0" i="0" u="none" strike="noStrike" cap="none">
+                <a:solidFill>
+                  <a:schemeClr val="dk1"/>
+                </a:solidFill>
+                <a:latin typeface="Arial"/>
+                <a:ea typeface="Arial"/>
+                <a:cs typeface="Arial"/>
+                <a:sym typeface="Arial"/>
+              </a:rPr>
+              <a:t>Man kann ein Java-Programm mit Parametern aufrufen</a:t>
+            </a:r>
+            <a:br>
+              <a:rPr lang="de" sz="1600" b="0" i="0" u="none" strike="noStrike" cap="none">
+                <a:solidFill>
+                  <a:schemeClr val="dk1"/>
+                </a:solidFill>
+                <a:latin typeface="Arial"/>
+                <a:ea typeface="Arial"/>
+                <a:cs typeface="Arial"/>
+                <a:sym typeface="Arial"/>
+              </a:rPr>
+            </a:br>
+            <a:endParaRPr/>
+          </a:p>
+          <a:p>
+            <a:pPr marL="457200" marR="0" lvl="0" indent="0" algn="l" rtl="0">
+              <a:lnSpc>
+                <a:spcPct val="100000"/>
+              </a:lnSpc>
+              <a:spcBef>
+                <a:spcPts val="0"/>
+              </a:spcBef>
+              <a:spcAft>
+                <a:spcPts val="0"/>
+              </a:spcAft>
+              <a:buNone/>
+            </a:pPr>
+            <a:endParaRPr/>
+          </a:p>
+          <a:p>
+            <a:pPr marL="0" marR="0" lvl="0" indent="0" algn="l" rtl="0">
+              <a:lnSpc>
+                <a:spcPct val="100000"/>
+              </a:lnSpc>
+              <a:spcBef>
+                <a:spcPts val="0"/>
+              </a:spcBef>
+              <a:spcAft>
+                <a:spcPts val="0"/>
+              </a:spcAft>
+              <a:buNone/>
+            </a:pPr>
+            <a:r>
+              <a:rPr lang="de" sz="1600" b="0" i="0" u="none" strike="noStrike" cap="none">
+                <a:solidFill>
+                  <a:schemeClr val="dk1"/>
+                </a:solidFill>
+                <a:latin typeface="Arial"/>
+                <a:ea typeface="Arial"/>
+                <a:cs typeface="Arial"/>
+                <a:sym typeface="Arial"/>
+              </a:rPr>
+              <a:t>Die Parameter werden dann als String-Array an die main-Funktion übergeben ( =&gt; String[ ] args )</a:t>
+            </a:r>
+            <a:endParaRPr sz="1600" b="0" i="0" u="none" strike="noStrike" cap="none">
+              <a:solidFill>
+                <a:schemeClr val="dk1"/>
+              </a:solidFill>
+              <a:latin typeface="Arial"/>
+              <a:ea typeface="Arial"/>
+              <a:cs typeface="Arial"/>
+              <a:sym typeface="Arial"/>
+            </a:endParaRPr>
+          </a:p>
+          <a:p>
+            <a:pPr marL="0" marR="0" lvl="0" indent="0" algn="l" rtl="0">
+              <a:lnSpc>
+                <a:spcPct val="100000"/>
+              </a:lnSpc>
+              <a:spcBef>
+                <a:spcPts val="0"/>
+              </a:spcBef>
+              <a:spcAft>
+                <a:spcPts val="0"/>
+              </a:spcAft>
+              <a:buNone/>
+            </a:pPr>
+            <a:r>
+              <a:rPr lang="de" sz="1600" b="0" i="0" u="none" strike="noStrike" cap="none">
+                <a:solidFill>
+                  <a:schemeClr val="dk1"/>
+                </a:solidFill>
+                <a:latin typeface="Arial"/>
+                <a:ea typeface="Arial"/>
+                <a:cs typeface="Arial"/>
+                <a:sym typeface="Arial"/>
+              </a:rPr>
+              <a:t>Variablen können, falls notwendig, zum passenden Datentypen geparst werden</a:t>
+            </a:r>
+            <a:br>
+              <a:rPr lang="de" sz="1600" b="0" i="0" u="none" strike="noStrike" cap="none">
+                <a:solidFill>
+                  <a:schemeClr val="dk1"/>
+                </a:solidFill>
+                <a:latin typeface="Arial"/>
+                <a:ea typeface="Arial"/>
+                <a:cs typeface="Arial"/>
+                <a:sym typeface="Arial"/>
+              </a:rPr>
+            </a:br>
+            <a:br>
+              <a:rPr lang="de" sz="1600" b="0" i="0" u="none" strike="noStrike" cap="none">
+                <a:solidFill>
+                  <a:schemeClr val="dk1"/>
+                </a:solidFill>
+                <a:latin typeface="Arial"/>
+                <a:ea typeface="Arial"/>
+                <a:cs typeface="Arial"/>
+                <a:sym typeface="Arial"/>
+              </a:rPr>
+            </a:br>
+            <a:br>
+              <a:rPr lang="de" sz="1600" b="0" i="0" u="none" strike="noStrike" cap="none">
+                <a:solidFill>
+                  <a:schemeClr val="dk1"/>
+                </a:solidFill>
+                <a:latin typeface="Arial"/>
+                <a:ea typeface="Arial"/>
+                <a:cs typeface="Arial"/>
+                <a:sym typeface="Arial"/>
+              </a:rPr>
+            </a:br>
+            <a:br>
+              <a:rPr lang="de" sz="1600" b="0" i="0" u="none" strike="noStrike" cap="none">
+                <a:solidFill>
+                  <a:schemeClr val="dk1"/>
+                </a:solidFill>
+                <a:latin typeface="Arial"/>
+                <a:ea typeface="Arial"/>
+                <a:cs typeface="Arial"/>
+                <a:sym typeface="Arial"/>
+              </a:rPr>
+            </a:br>
+            <a:br>
+              <a:rPr lang="de" sz="1600" b="0" i="0" u="none" strike="noStrike" cap="none">
+                <a:solidFill>
+                  <a:schemeClr val="dk1"/>
+                </a:solidFill>
+                <a:latin typeface="Arial"/>
+                <a:ea typeface="Arial"/>
+                <a:cs typeface="Arial"/>
+                <a:sym typeface="Arial"/>
+              </a:rPr>
+            </a:br>
+            <a:br>
+              <a:rPr lang="de" sz="1600" b="0" i="0" u="none" strike="noStrike" cap="none">
+                <a:solidFill>
+                  <a:schemeClr val="dk1"/>
+                </a:solidFill>
+                <a:latin typeface="Arial"/>
+                <a:ea typeface="Arial"/>
+                <a:cs typeface="Arial"/>
+                <a:sym typeface="Arial"/>
+              </a:rPr>
+            </a:br>
+            <a:endParaRPr sz="1600" b="0" i="0" u="none" strike="noStrike" cap="none">
+              <a:solidFill>
+                <a:schemeClr val="dk1"/>
+              </a:solidFill>
+              <a:latin typeface="Arial"/>
+              <a:ea typeface="Arial"/>
+              <a:cs typeface="Arial"/>
+              <a:sym typeface="Arial"/>
+            </a:endParaRPr>
+          </a:p>
+          <a:p>
+            <a:pPr marL="0" marR="0" lvl="0" indent="0" algn="l" rtl="0">
+              <a:lnSpc>
+                <a:spcPct val="100000"/>
+              </a:lnSpc>
+              <a:spcBef>
+                <a:spcPts val="0"/>
+              </a:spcBef>
+              <a:spcAft>
+                <a:spcPts val="0"/>
+              </a:spcAft>
+              <a:buNone/>
+            </a:pPr>
+            <a:r>
+              <a:rPr lang="de" sz="1600" b="0" i="0" u="none" strike="noStrike" cap="none">
+                <a:solidFill>
+                  <a:schemeClr val="dk1"/>
+                </a:solidFill>
+                <a:latin typeface="Arial"/>
+                <a:ea typeface="Arial"/>
+                <a:cs typeface="Arial"/>
+                <a:sym typeface="Arial"/>
+              </a:rPr>
+              <a:t>Möchte man einen String mit Leerzeichen übergeben, muss man diesen in Anführungszeichen setzen, damit es als einzelner Parameter betrachtet wird</a:t>
+            </a:r>
+            <a:endParaRPr sz="1600" b="0" i="0" u="none" strike="noStrike" cap="none">
+              <a:solidFill>
+                <a:schemeClr val="dk1"/>
+              </a:solidFill>
+              <a:latin typeface="Arial"/>
+              <a:ea typeface="Arial"/>
+              <a:cs typeface="Arial"/>
+              <a:sym typeface="Arial"/>
+            </a:endParaRPr>
+          </a:p>
+        </p:txBody>
+      </p:sp>
+      <p:pic>
+        <p:nvPicPr>
+          <p:cNvPr id="129" name="Google Shape;129;p22"/>
+          <p:cNvPicPr preferRelativeResize="0"/>
+          <p:nvPr/>
+        </p:nvPicPr>
+        <p:blipFill rotWithShape="1">
+          <a:blip r:embed="rId3">
+            <a:alphaModFix/>
+          </a:blip>
+          <a:srcRect/>
+          <a:stretch/>
+        </p:blipFill>
+        <p:spPr>
+          <a:xfrm>
+            <a:off x="1354638" y="1121573"/>
+            <a:ext cx="6530024" cy="259625"/>
+          </a:xfrm>
+          <a:prstGeom prst="rect">
+            <a:avLst/>
+          </a:prstGeom>
+          <a:noFill/>
+          <a:ln>
+            <a:noFill/>
+          </a:ln>
+        </p:spPr>
+      </p:pic>
+      <p:pic>
+        <p:nvPicPr>
+          <p:cNvPr id="130" name="Google Shape;130;p22"/>
+          <p:cNvPicPr preferRelativeResize="0"/>
+          <p:nvPr/>
+        </p:nvPicPr>
+        <p:blipFill rotWithShape="1">
+          <a:blip r:embed="rId4">
+            <a:alphaModFix/>
+          </a:blip>
+          <a:srcRect/>
+          <a:stretch/>
+        </p:blipFill>
+        <p:spPr>
+          <a:xfrm>
+            <a:off x="2581650" y="2320025"/>
+            <a:ext cx="3790200" cy="1259025"/>
+          </a:xfrm>
+          <a:prstGeom prst="rect">
+            <a:avLst/>
+          </a:prstGeom>
+          <a:noFill/>
+          <a:ln>
+            <a:noFill/>
+          </a:ln>
+        </p:spPr>
+      </p:pic>
+    </p:spTree>
+  </p:cSld>
+  <p:clrMapOvr>
+    <a:masterClrMapping/>
+  </p:clrMapOvr>
+</p:sld>
+</file>
+
+<file path=ppt/slides/slide11.xml><?xml version="1.0" encoding="utf-8"?>
+<p:sld xmlns:a="http://schemas.openxmlformats.org/drawingml/2006/main" xmlns:r="http://schemas.openxmlformats.org/officeDocument/2006/relationships" xmlns:p="http://schemas.openxmlformats.org/presentationml/2006/main">
+  <p:cSld>
+    <p:spTree>
+      <p:nvGrpSpPr>
         <p:cNvPr id="1" name="Shape 134"/>
         <p:cNvGrpSpPr/>
         <p:nvPr/>
@@ -10111,7 +10495,7 @@
 </p:sld>
 </file>
 
-<file path=ppt/slides/slide11.xml><?xml version="1.0" encoding="utf-8"?>
+<file path=ppt/slides/slide12.xml><?xml version="1.0" encoding="utf-8"?>
 <p:sld xmlns:a="http://schemas.openxmlformats.org/drawingml/2006/main" xmlns:r="http://schemas.openxmlformats.org/officeDocument/2006/relationships" xmlns:p="http://schemas.openxmlformats.org/presentationml/2006/main">
   <p:cSld>
     <p:spTree>
@@ -10339,7 +10723,7 @@
 </p:sld>
 </file>
 
-<file path=ppt/slides/slide12.xml><?xml version="1.0" encoding="utf-8"?>
+<file path=ppt/slides/slide13.xml><?xml version="1.0" encoding="utf-8"?>
 <p:sld xmlns:a="http://schemas.openxmlformats.org/drawingml/2006/main" xmlns:r="http://schemas.openxmlformats.org/officeDocument/2006/relationships" xmlns:p="http://schemas.openxmlformats.org/presentationml/2006/main">
   <p:cSld>
     <p:spTree>
@@ -11320,10 +11704,10 @@
       </p:sp>
       <p:pic>
         <p:nvPicPr>
-          <p:cNvPr id="10" name="Grafik 9">
+          <p:cNvPr id="12" name="Grafik 11">
             <a:extLst>
               <a:ext uri="{FF2B5EF4-FFF2-40B4-BE49-F238E27FC236}">
-                <a16:creationId xmlns:a16="http://schemas.microsoft.com/office/drawing/2014/main" id="{A3E012F1-803D-F5EB-F0BA-4A14833F4677}"/>
+                <a16:creationId xmlns:a16="http://schemas.microsoft.com/office/drawing/2014/main" id="{210D4F8B-417E-833C-20FF-B167E833D500}"/>
               </a:ext>
             </a:extLst>
           </p:cNvPr>
@@ -11340,68 +11724,8 @@
         </p:blipFill>
         <p:spPr>
           <a:xfrm>
-            <a:off x="4083509" y="767025"/>
-            <a:ext cx="4647054" cy="1215578"/>
-          </a:xfrm>
-          <a:prstGeom prst="rect">
-            <a:avLst/>
-          </a:prstGeom>
-        </p:spPr>
-      </p:pic>
-      <p:pic>
-        <p:nvPicPr>
-          <p:cNvPr id="12" name="Grafik 11">
-            <a:extLst>
-              <a:ext uri="{FF2B5EF4-FFF2-40B4-BE49-F238E27FC236}">
-                <a16:creationId xmlns:a16="http://schemas.microsoft.com/office/drawing/2014/main" id="{210D4F8B-417E-833C-20FF-B167E833D500}"/>
-              </a:ext>
-            </a:extLst>
-          </p:cNvPr>
-          <p:cNvPicPr>
-            <a:picLocks noChangeAspect="1"/>
-          </p:cNvPicPr>
-          <p:nvPr/>
-        </p:nvPicPr>
-        <p:blipFill>
-          <a:blip r:embed="rId3"/>
-          <a:stretch>
-            <a:fillRect/>
-          </a:stretch>
-        </p:blipFill>
-        <p:spPr>
-          <a:xfrm>
             <a:off x="323065" y="767025"/>
             <a:ext cx="3584508" cy="3360875"/>
-          </a:xfrm>
-          <a:prstGeom prst="rect">
-            <a:avLst/>
-          </a:prstGeom>
-        </p:spPr>
-      </p:pic>
-      <p:pic>
-        <p:nvPicPr>
-          <p:cNvPr id="4" name="Grafik 3">
-            <a:extLst>
-              <a:ext uri="{FF2B5EF4-FFF2-40B4-BE49-F238E27FC236}">
-                <a16:creationId xmlns:a16="http://schemas.microsoft.com/office/drawing/2014/main" id="{1423BD68-6EA2-0EFF-EFC3-AB207BB3B6E9}"/>
-              </a:ext>
-            </a:extLst>
-          </p:cNvPr>
-          <p:cNvPicPr>
-            <a:picLocks noChangeAspect="1"/>
-          </p:cNvPicPr>
-          <p:nvPr/>
-        </p:nvPicPr>
-        <p:blipFill>
-          <a:blip r:embed="rId4"/>
-          <a:stretch>
-            <a:fillRect/>
-          </a:stretch>
-        </p:blipFill>
-        <p:spPr>
-          <a:xfrm>
-            <a:off x="4285110" y="2192523"/>
-            <a:ext cx="3213456" cy="2142304"/>
           </a:xfrm>
           <a:prstGeom prst="rect">
             <a:avLst/>
@@ -11444,6 +11768,66 @@
           </a:fontRef>
         </p:style>
       </p:cxnSp>
+      <p:pic>
+        <p:nvPicPr>
+          <p:cNvPr id="5" name="Grafik 4">
+            <a:extLst>
+              <a:ext uri="{FF2B5EF4-FFF2-40B4-BE49-F238E27FC236}">
+                <a16:creationId xmlns:a16="http://schemas.microsoft.com/office/drawing/2014/main" id="{90E3C8A8-FBB4-8E15-1577-1E273C3A4F03}"/>
+              </a:ext>
+            </a:extLst>
+          </p:cNvPr>
+          <p:cNvPicPr>
+            <a:picLocks noChangeAspect="1"/>
+          </p:cNvPicPr>
+          <p:nvPr/>
+        </p:nvPicPr>
+        <p:blipFill>
+          <a:blip r:embed="rId3"/>
+          <a:stretch>
+            <a:fillRect/>
+          </a:stretch>
+        </p:blipFill>
+        <p:spPr>
+          <a:xfrm>
+            <a:off x="4083509" y="815264"/>
+            <a:ext cx="4849024" cy="1099023"/>
+          </a:xfrm>
+          <a:prstGeom prst="rect">
+            <a:avLst/>
+          </a:prstGeom>
+        </p:spPr>
+      </p:pic>
+      <p:pic>
+        <p:nvPicPr>
+          <p:cNvPr id="8" name="Grafik 7">
+            <a:extLst>
+              <a:ext uri="{FF2B5EF4-FFF2-40B4-BE49-F238E27FC236}">
+                <a16:creationId xmlns:a16="http://schemas.microsoft.com/office/drawing/2014/main" id="{C1D5EC92-9251-1011-7963-F96EF6ED7811}"/>
+              </a:ext>
+            </a:extLst>
+          </p:cNvPr>
+          <p:cNvPicPr>
+            <a:picLocks noChangeAspect="1"/>
+          </p:cNvPicPr>
+          <p:nvPr/>
+        </p:nvPicPr>
+        <p:blipFill>
+          <a:blip r:embed="rId4"/>
+          <a:stretch>
+            <a:fillRect/>
+          </a:stretch>
+        </p:blipFill>
+        <p:spPr>
+          <a:xfrm>
+            <a:off x="4213109" y="2076203"/>
+            <a:ext cx="3685291" cy="2459265"/>
+          </a:xfrm>
+          <a:prstGeom prst="rect">
+            <a:avLst/>
+          </a:prstGeom>
+        </p:spPr>
+      </p:pic>
     </p:spTree>
     <p:extLst>
       <p:ext uri="{BB962C8B-B14F-4D97-AF65-F5344CB8AC3E}">
@@ -11532,7 +11916,7 @@
         </p:blipFill>
         <p:spPr>
           <a:xfrm>
-            <a:off x="4262114" y="2554928"/>
+            <a:off x="3901512" y="2764715"/>
             <a:ext cx="2921923" cy="684345"/>
           </a:xfrm>
           <a:prstGeom prst="rect">
@@ -11572,10 +11956,10 @@
       </p:pic>
       <p:pic>
         <p:nvPicPr>
-          <p:cNvPr id="15" name="Grafik 14">
+          <p:cNvPr id="4" name="Grafik 3">
             <a:extLst>
               <a:ext uri="{FF2B5EF4-FFF2-40B4-BE49-F238E27FC236}">
-                <a16:creationId xmlns:a16="http://schemas.microsoft.com/office/drawing/2014/main" id="{C9C791D0-3A3D-9797-73A3-907D426D0B4F}"/>
+                <a16:creationId xmlns:a16="http://schemas.microsoft.com/office/drawing/2014/main" id="{44221335-8C48-811F-4C6F-1130454A1907}"/>
               </a:ext>
             </a:extLst>
           </p:cNvPr>
@@ -11592,8 +11976,8 @@
         </p:blipFill>
         <p:spPr>
           <a:xfrm>
-            <a:off x="4262114" y="904612"/>
-            <a:ext cx="4545386" cy="1341788"/>
+            <a:off x="3901512" y="777159"/>
+            <a:ext cx="5093787" cy="1512441"/>
           </a:xfrm>
           <a:prstGeom prst="rect">
             <a:avLst/>
@@ -11614,6 +11998,160 @@
 </file>
 
 <file path=ppt/slides/slide7.xml><?xml version="1.0" encoding="utf-8"?>
+<p:sld xmlns:a="http://schemas.openxmlformats.org/drawingml/2006/main" xmlns:r="http://schemas.openxmlformats.org/officeDocument/2006/relationships" xmlns:p="http://schemas.openxmlformats.org/presentationml/2006/main">
+  <p:cSld>
+    <p:spTree>
+      <p:nvGrpSpPr>
+        <p:cNvPr id="1" name=""/>
+        <p:cNvGrpSpPr/>
+        <p:nvPr/>
+      </p:nvGrpSpPr>
+      <p:grpSpPr>
+        <a:xfrm>
+          <a:off x="0" y="0"/>
+          <a:ext cx="0" cy="0"/>
+          <a:chOff x="0" y="0"/>
+          <a:chExt cx="0" cy="0"/>
+        </a:xfrm>
+      </p:grpSpPr>
+      <p:sp>
+        <p:nvSpPr>
+          <p:cNvPr id="2" name="Titel 1">
+            <a:extLst>
+              <a:ext uri="{FF2B5EF4-FFF2-40B4-BE49-F238E27FC236}">
+                <a16:creationId xmlns:a16="http://schemas.microsoft.com/office/drawing/2014/main" id="{F207AB37-1258-90D8-0E43-6DE051D67950}"/>
+              </a:ext>
+            </a:extLst>
+          </p:cNvPr>
+          <p:cNvSpPr>
+            <a:spLocks noGrp="1"/>
+          </p:cNvSpPr>
+          <p:nvPr>
+            <p:ph type="title"/>
+          </p:nvPr>
+        </p:nvSpPr>
+        <p:spPr/>
+        <p:txBody>
+          <a:bodyPr/>
+          <a:lstStyle/>
+          <a:p>
+            <a:r>
+              <a:rPr lang="de-DE" dirty="0"/>
+              <a:t>1.1 </a:t>
+            </a:r>
+            <a:r>
+              <a:rPr lang="de-DE" dirty="0" err="1"/>
+              <a:t>If-else</a:t>
+            </a:r>
+            <a:r>
+              <a:rPr lang="de-DE" dirty="0"/>
+              <a:t> – Tipps und Warnungen</a:t>
+            </a:r>
+          </a:p>
+        </p:txBody>
+      </p:sp>
+      <p:pic>
+        <p:nvPicPr>
+          <p:cNvPr id="1026" name="Picture 2" descr="Guard Clauses – Stop using Else in your code – Lars Fosdal">
+            <a:extLst>
+              <a:ext uri="{FF2B5EF4-FFF2-40B4-BE49-F238E27FC236}">
+                <a16:creationId xmlns:a16="http://schemas.microsoft.com/office/drawing/2014/main" id="{B228CAC3-E375-B737-891A-D46A3E8DE32F}"/>
+              </a:ext>
+            </a:extLst>
+          </p:cNvPr>
+          <p:cNvPicPr>
+            <a:picLocks noChangeAspect="1" noChangeArrowheads="1"/>
+          </p:cNvPicPr>
+          <p:nvPr/>
+        </p:nvPicPr>
+        <p:blipFill>
+          <a:blip r:embed="rId2">
+            <a:extLst>
+              <a:ext uri="{28A0092B-C50C-407E-A947-70E740481C1C}">
+                <a14:useLocalDpi xmlns:a14="http://schemas.microsoft.com/office/drawing/2010/main" val="0"/>
+              </a:ext>
+            </a:extLst>
+          </a:blip>
+          <a:srcRect/>
+          <a:stretch>
+            <a:fillRect/>
+          </a:stretch>
+        </p:blipFill>
+        <p:spPr bwMode="auto">
+          <a:xfrm>
+            <a:off x="2508455" y="757313"/>
+            <a:ext cx="4127090" cy="2929087"/>
+          </a:xfrm>
+          <a:prstGeom prst="rect">
+            <a:avLst/>
+          </a:prstGeom>
+          <a:noFill/>
+          <a:extLst>
+            <a:ext uri="{909E8E84-426E-40DD-AFC4-6F175D3DCCD1}">
+              <a14:hiddenFill xmlns:a14="http://schemas.microsoft.com/office/drawing/2010/main">
+                <a:solidFill>
+                  <a:srgbClr val="FFFFFF"/>
+                </a:solidFill>
+              </a14:hiddenFill>
+            </a:ext>
+          </a:extLst>
+        </p:spPr>
+      </p:pic>
+      <p:sp>
+        <p:nvSpPr>
+          <p:cNvPr id="4" name="Textfeld 3">
+            <a:extLst>
+              <a:ext uri="{FF2B5EF4-FFF2-40B4-BE49-F238E27FC236}">
+                <a16:creationId xmlns:a16="http://schemas.microsoft.com/office/drawing/2014/main" id="{90B8E8F7-6FBF-B709-12A9-29D9054D4294}"/>
+              </a:ext>
+            </a:extLst>
+          </p:cNvPr>
+          <p:cNvSpPr txBox="1"/>
+          <p:nvPr/>
+        </p:nvSpPr>
+        <p:spPr>
+          <a:xfrm>
+            <a:off x="2508455" y="3829369"/>
+            <a:ext cx="4809600" cy="215444"/>
+          </a:xfrm>
+          <a:prstGeom prst="rect">
+            <a:avLst/>
+          </a:prstGeom>
+          <a:noFill/>
+        </p:spPr>
+        <p:txBody>
+          <a:bodyPr wrap="square" rtlCol="0">
+            <a:spAutoFit/>
+          </a:bodyPr>
+          <a:lstStyle/>
+          <a:p>
+            <a:r>
+              <a:rPr lang="de-DE" sz="800" dirty="0">
+                <a:solidFill>
+                  <a:schemeClr val="tx2">
+                    <a:lumMod val="90000"/>
+                  </a:schemeClr>
+                </a:solidFill>
+              </a:rPr>
+              <a:t>Quelle: https://betterprogramming.pub/why-you-need-to-stop-using-else-statements-5b1fd09dea9e</a:t>
+            </a:r>
+          </a:p>
+        </p:txBody>
+      </p:sp>
+    </p:spTree>
+    <p:extLst>
+      <p:ext uri="{BB962C8B-B14F-4D97-AF65-F5344CB8AC3E}">
+        <p14:creationId xmlns:p14="http://schemas.microsoft.com/office/powerpoint/2010/main" val="3004116258"/>
+      </p:ext>
+    </p:extLst>
+  </p:cSld>
+  <p:clrMapOvr>
+    <a:masterClrMapping/>
+  </p:clrMapOvr>
+</p:sld>
+</file>
+
+<file path=ppt/slides/slide8.xml><?xml version="1.0" encoding="utf-8"?>
 <p:sld xmlns:a="http://schemas.openxmlformats.org/drawingml/2006/main" xmlns:r="http://schemas.openxmlformats.org/officeDocument/2006/relationships" xmlns:p="http://schemas.openxmlformats.org/presentationml/2006/main">
   <p:cSld>
     <p:spTree>
@@ -11790,7 +12328,7 @@
 </p:sld>
 </file>
 
-<file path=ppt/slides/slide8.xml><?xml version="1.0" encoding="utf-8"?>
+<file path=ppt/slides/slide9.xml><?xml version="1.0" encoding="utf-8"?>
 <p:sld xmlns:a="http://schemas.openxmlformats.org/drawingml/2006/main" xmlns:r="http://schemas.openxmlformats.org/officeDocument/2006/relationships" xmlns:p="http://schemas.openxmlformats.org/presentationml/2006/main">
   <p:cSld>
     <p:spTree>
@@ -11985,389 +12523,6 @@
           <a:xfrm>
             <a:off x="1804550" y="1553974"/>
             <a:ext cx="5534876" cy="838625"/>
-          </a:xfrm>
-          <a:prstGeom prst="rect">
-            <a:avLst/>
-          </a:prstGeom>
-          <a:noFill/>
-          <a:ln>
-            <a:noFill/>
-          </a:ln>
-        </p:spPr>
-      </p:pic>
-    </p:spTree>
-  </p:cSld>
-  <p:clrMapOvr>
-    <a:masterClrMapping/>
-  </p:clrMapOvr>
-</p:sld>
-</file>
-
-<file path=ppt/slides/slide9.xml><?xml version="1.0" encoding="utf-8"?>
-<p:sld xmlns:a="http://schemas.openxmlformats.org/drawingml/2006/main" xmlns:r="http://schemas.openxmlformats.org/officeDocument/2006/relationships" xmlns:p="http://schemas.openxmlformats.org/presentationml/2006/main">
-  <p:cSld>
-    <p:spTree>
-      <p:nvGrpSpPr>
-        <p:cNvPr id="1" name="Shape 126"/>
-        <p:cNvGrpSpPr/>
-        <p:nvPr/>
-      </p:nvGrpSpPr>
-      <p:grpSpPr>
-        <a:xfrm>
-          <a:off x="0" y="0"/>
-          <a:ext cx="0" cy="0"/>
-          <a:chOff x="0" y="0"/>
-          <a:chExt cx="0" cy="0"/>
-        </a:xfrm>
-      </p:grpSpPr>
-      <p:sp>
-        <p:nvSpPr>
-          <p:cNvPr id="127" name="Google Shape;127;p22"/>
-          <p:cNvSpPr txBox="1">
-            <a:spLocks noGrp="1"/>
-          </p:cNvSpPr>
-          <p:nvPr>
-            <p:ph type="title"/>
-          </p:nvPr>
-        </p:nvSpPr>
-        <p:spPr>
-          <a:xfrm>
-            <a:off x="431800" y="83344"/>
-            <a:ext cx="8375700" cy="531000"/>
-          </a:xfrm>
-          <a:prstGeom prst="rect">
-            <a:avLst/>
-          </a:prstGeom>
-          <a:noFill/>
-          <a:ln>
-            <a:noFill/>
-          </a:ln>
-        </p:spPr>
-        <p:txBody>
-          <a:bodyPr spcFirstLastPara="1" wrap="square" lIns="0" tIns="0" rIns="0" bIns="0" anchor="b" anchorCtr="0">
-            <a:noAutofit/>
-          </a:bodyPr>
-          <a:lstStyle/>
-          <a:p>
-            <a:pPr marL="0" lvl="0" indent="0" algn="l" rtl="0">
-              <a:lnSpc>
-                <a:spcPct val="100000"/>
-              </a:lnSpc>
-              <a:spcBef>
-                <a:spcPts val="0"/>
-              </a:spcBef>
-              <a:spcAft>
-                <a:spcPts val="0"/>
-              </a:spcAft>
-              <a:buSzPts val="1400"/>
-              <a:buNone/>
-            </a:pPr>
-            <a:r>
-              <a:rPr lang="de"/>
-              <a:t>2.1. Parametrisierung - Kommandozeilenparameter</a:t>
-            </a:r>
-            <a:endParaRPr/>
-          </a:p>
-        </p:txBody>
-      </p:sp>
-      <p:sp>
-        <p:nvSpPr>
-          <p:cNvPr id="128" name="Google Shape;128;p22"/>
-          <p:cNvSpPr>
-            <a:spLocks noGrp="1"/>
-          </p:cNvSpPr>
-          <p:nvPr>
-            <p:ph type="chart" idx="2"/>
-          </p:nvPr>
-        </p:nvSpPr>
-        <p:spPr>
-          <a:xfrm>
-            <a:off x="431800" y="782241"/>
-            <a:ext cx="8375700" cy="3579000"/>
-          </a:xfrm>
-          <a:prstGeom prst="rect">
-            <a:avLst/>
-          </a:prstGeom>
-          <a:noFill/>
-          <a:ln>
-            <a:noFill/>
-          </a:ln>
-        </p:spPr>
-        <p:txBody>
-          <a:bodyPr spcFirstLastPara="1" wrap="square" lIns="0" tIns="0" rIns="0" bIns="0" anchor="t" anchorCtr="0">
-            <a:noAutofit/>
-          </a:bodyPr>
-          <a:lstStyle/>
-          <a:p>
-            <a:pPr marL="0" marR="0" lvl="0" indent="0" algn="l" rtl="0">
-              <a:lnSpc>
-                <a:spcPct val="100000"/>
-              </a:lnSpc>
-              <a:spcBef>
-                <a:spcPts val="0"/>
-              </a:spcBef>
-              <a:spcAft>
-                <a:spcPts val="0"/>
-              </a:spcAft>
-              <a:buNone/>
-            </a:pPr>
-            <a:r>
-              <a:rPr lang="de" sz="1600" b="0" i="0" u="none" strike="noStrike" cap="none">
-                <a:solidFill>
-                  <a:schemeClr val="dk1"/>
-                </a:solidFill>
-                <a:latin typeface="Arial"/>
-                <a:ea typeface="Arial"/>
-                <a:cs typeface="Arial"/>
-                <a:sym typeface="Arial"/>
-              </a:rPr>
-              <a:t>Man kann ein Java-Programm mit Parametern aufrufen</a:t>
-            </a:r>
-            <a:br>
-              <a:rPr lang="de" sz="1600" b="0" i="0" u="none" strike="noStrike" cap="none">
-                <a:solidFill>
-                  <a:schemeClr val="dk1"/>
-                </a:solidFill>
-                <a:latin typeface="Arial"/>
-                <a:ea typeface="Arial"/>
-                <a:cs typeface="Arial"/>
-                <a:sym typeface="Arial"/>
-              </a:rPr>
-            </a:br>
-            <a:endParaRPr/>
-          </a:p>
-          <a:p>
-            <a:pPr marL="457200" marR="0" lvl="0" indent="0" algn="l" rtl="0">
-              <a:lnSpc>
-                <a:spcPct val="100000"/>
-              </a:lnSpc>
-              <a:spcBef>
-                <a:spcPts val="0"/>
-              </a:spcBef>
-              <a:spcAft>
-                <a:spcPts val="0"/>
-              </a:spcAft>
-              <a:buNone/>
-            </a:pPr>
-            <a:endParaRPr/>
-          </a:p>
-          <a:p>
-            <a:pPr marL="0" marR="0" lvl="0" indent="0" algn="l" rtl="0">
-              <a:lnSpc>
-                <a:spcPct val="100000"/>
-              </a:lnSpc>
-              <a:spcBef>
-                <a:spcPts val="0"/>
-              </a:spcBef>
-              <a:spcAft>
-                <a:spcPts val="0"/>
-              </a:spcAft>
-              <a:buNone/>
-            </a:pPr>
-            <a:r>
-              <a:rPr lang="de" sz="1600" b="0" i="0" u="none" strike="noStrike" cap="none">
-                <a:solidFill>
-                  <a:schemeClr val="dk1"/>
-                </a:solidFill>
-                <a:latin typeface="Arial"/>
-                <a:ea typeface="Arial"/>
-                <a:cs typeface="Arial"/>
-                <a:sym typeface="Arial"/>
-              </a:rPr>
-              <a:t>Die Parameter werden dann als String-Array an die main-Funktion übergeben ( =&gt; String[ ] args )</a:t>
-            </a:r>
-            <a:endParaRPr sz="1600" b="0" i="0" u="none" strike="noStrike" cap="none">
-              <a:solidFill>
-                <a:schemeClr val="dk1"/>
-              </a:solidFill>
-              <a:latin typeface="Arial"/>
-              <a:ea typeface="Arial"/>
-              <a:cs typeface="Arial"/>
-              <a:sym typeface="Arial"/>
-            </a:endParaRPr>
-          </a:p>
-          <a:p>
-            <a:pPr marL="0" marR="0" lvl="0" indent="0" algn="l" rtl="0">
-              <a:lnSpc>
-                <a:spcPct val="100000"/>
-              </a:lnSpc>
-              <a:spcBef>
-                <a:spcPts val="0"/>
-              </a:spcBef>
-              <a:spcAft>
-                <a:spcPts val="0"/>
-              </a:spcAft>
-              <a:buNone/>
-            </a:pPr>
-            <a:r>
-              <a:rPr lang="de" sz="1600" b="0" i="0" u="none" strike="noStrike" cap="none">
-                <a:solidFill>
-                  <a:schemeClr val="dk1"/>
-                </a:solidFill>
-                <a:latin typeface="Arial"/>
-                <a:ea typeface="Arial"/>
-                <a:cs typeface="Arial"/>
-                <a:sym typeface="Arial"/>
-              </a:rPr>
-              <a:t>Variablen können, falls notwendig, zum passenden Datentypen geparst werden</a:t>
-            </a:r>
-            <a:br>
-              <a:rPr lang="de" sz="1600" b="0" i="0" u="none" strike="noStrike" cap="none">
-                <a:solidFill>
-                  <a:schemeClr val="dk1"/>
-                </a:solidFill>
-                <a:latin typeface="Arial"/>
-                <a:ea typeface="Arial"/>
-                <a:cs typeface="Arial"/>
-                <a:sym typeface="Arial"/>
-              </a:rPr>
-            </a:br>
-            <a:br>
-              <a:rPr lang="de" sz="1600" b="0" i="0" u="none" strike="noStrike" cap="none">
-                <a:solidFill>
-                  <a:schemeClr val="dk1"/>
-                </a:solidFill>
-                <a:latin typeface="Arial"/>
-                <a:ea typeface="Arial"/>
-                <a:cs typeface="Arial"/>
-                <a:sym typeface="Arial"/>
-              </a:rPr>
-            </a:br>
-            <a:br>
-              <a:rPr lang="de" sz="1600" b="0" i="0" u="none" strike="noStrike" cap="none">
-                <a:solidFill>
-                  <a:schemeClr val="dk1"/>
-                </a:solidFill>
-                <a:latin typeface="Arial"/>
-                <a:ea typeface="Arial"/>
-                <a:cs typeface="Arial"/>
-                <a:sym typeface="Arial"/>
-              </a:rPr>
-            </a:br>
-            <a:br>
-              <a:rPr lang="de" sz="1600" b="0" i="0" u="none" strike="noStrike" cap="none">
-                <a:solidFill>
-                  <a:schemeClr val="dk1"/>
-                </a:solidFill>
-                <a:latin typeface="Arial"/>
-                <a:ea typeface="Arial"/>
-                <a:cs typeface="Arial"/>
-                <a:sym typeface="Arial"/>
-              </a:rPr>
-            </a:br>
-            <a:br>
-              <a:rPr lang="de" sz="1600" b="0" i="0" u="none" strike="noStrike" cap="none">
-                <a:solidFill>
-                  <a:schemeClr val="dk1"/>
-                </a:solidFill>
-                <a:latin typeface="Arial"/>
-                <a:ea typeface="Arial"/>
-                <a:cs typeface="Arial"/>
-                <a:sym typeface="Arial"/>
-              </a:rPr>
-            </a:br>
-            <a:br>
-              <a:rPr lang="de" sz="1600" b="0" i="0" u="none" strike="noStrike" cap="none">
-                <a:solidFill>
-                  <a:schemeClr val="dk1"/>
-                </a:solidFill>
-                <a:latin typeface="Arial"/>
-                <a:ea typeface="Arial"/>
-                <a:cs typeface="Arial"/>
-                <a:sym typeface="Arial"/>
-              </a:rPr>
-            </a:br>
-            <a:endParaRPr sz="1600" b="0" i="0" u="none" strike="noStrike" cap="none">
-              <a:solidFill>
-                <a:schemeClr val="dk1"/>
-              </a:solidFill>
-              <a:latin typeface="Arial"/>
-              <a:ea typeface="Arial"/>
-              <a:cs typeface="Arial"/>
-              <a:sym typeface="Arial"/>
-            </a:endParaRPr>
-          </a:p>
-          <a:p>
-            <a:pPr marL="0" marR="0" lvl="0" indent="0" algn="l" rtl="0">
-              <a:lnSpc>
-                <a:spcPct val="100000"/>
-              </a:lnSpc>
-              <a:spcBef>
-                <a:spcPts val="0"/>
-              </a:spcBef>
-              <a:spcAft>
-                <a:spcPts val="0"/>
-              </a:spcAft>
-              <a:buNone/>
-            </a:pPr>
-            <a:r>
-              <a:rPr lang="de" sz="1600" b="0" i="0" u="none" strike="noStrike" cap="none">
-                <a:solidFill>
-                  <a:schemeClr val="dk1"/>
-                </a:solidFill>
-                <a:latin typeface="Arial"/>
-                <a:ea typeface="Arial"/>
-                <a:cs typeface="Arial"/>
-                <a:sym typeface="Arial"/>
-              </a:rPr>
-              <a:t>Möchte man einen String mit Leerzeichen übergeben, muss man diesen in Anführungszeichen setzen, damit es als einzelner Parameter betrachtet wird</a:t>
-            </a:r>
-            <a:endParaRPr sz="1600" b="0" i="0" u="none" strike="noStrike" cap="none">
-              <a:solidFill>
-                <a:schemeClr val="dk1"/>
-              </a:solidFill>
-              <a:latin typeface="Arial"/>
-              <a:ea typeface="Arial"/>
-              <a:cs typeface="Arial"/>
-              <a:sym typeface="Arial"/>
-            </a:endParaRPr>
-          </a:p>
-        </p:txBody>
-      </p:sp>
-      <p:pic>
-        <p:nvPicPr>
-          <p:cNvPr id="129" name="Google Shape;129;p22"/>
-          <p:cNvPicPr preferRelativeResize="0"/>
-          <p:nvPr/>
-        </p:nvPicPr>
-        <p:blipFill rotWithShape="1">
-          <a:blip r:embed="rId3">
-            <a:alphaModFix/>
-          </a:blip>
-          <a:srcRect/>
-          <a:stretch/>
-        </p:blipFill>
-        <p:spPr>
-          <a:xfrm>
-            <a:off x="1354638" y="1121573"/>
-            <a:ext cx="6530024" cy="259625"/>
-          </a:xfrm>
-          <a:prstGeom prst="rect">
-            <a:avLst/>
-          </a:prstGeom>
-          <a:noFill/>
-          <a:ln>
-            <a:noFill/>
-          </a:ln>
-        </p:spPr>
-      </p:pic>
-      <p:pic>
-        <p:nvPicPr>
-          <p:cNvPr id="130" name="Google Shape;130;p22"/>
-          <p:cNvPicPr preferRelativeResize="0"/>
-          <p:nvPr/>
-        </p:nvPicPr>
-        <p:blipFill rotWithShape="1">
-          <a:blip r:embed="rId4">
-            <a:alphaModFix/>
-          </a:blip>
-          <a:srcRect/>
-          <a:stretch/>
-        </p:blipFill>
-        <p:spPr>
-          <a:xfrm>
-            <a:off x="2581650" y="2320025"/>
-            <a:ext cx="3790200" cy="1259025"/>
           </a:xfrm>
           <a:prstGeom prst="rect">
             <a:avLst/>

</xml_diff>